<commit_message>
adding the app_12 file
</commit_message>
<xml_diff>
--- a/Emission_Factor_Tool_Presentation.pptx
+++ b/Emission_Factor_Tool_Presentation.pptx
@@ -134,7 +134,7 @@
   <pc:docChgLst>
     <pc:chgData name="Ritu Gothwal" userId="b01fe2d9-9058-45ee-8f71-eb6d80a94993" providerId="ADAL" clId="{07608D2A-EAD5-439C-BA35-92C5E37B3F41}"/>
     <pc:docChg chg="undo custSel modSld">
-      <pc:chgData name="Ritu Gothwal" userId="b01fe2d9-9058-45ee-8f71-eb6d80a94993" providerId="ADAL" clId="{07608D2A-EAD5-439C-BA35-92C5E37B3F41}" dt="2025-01-30T18:01:00.893" v="168" actId="20577"/>
+      <pc:chgData name="Ritu Gothwal" userId="b01fe2d9-9058-45ee-8f71-eb6d80a94993" providerId="ADAL" clId="{07608D2A-EAD5-439C-BA35-92C5E37B3F41}" dt="2025-02-06T16:54:29.537" v="198" actId="27636"/>
       <pc:docMkLst>
         <pc:docMk/>
       </pc:docMkLst>
@@ -149,6 +149,36 @@
           <ac:spMkLst>
             <pc:docMk/>
             <pc:sldMk cId="0" sldId="256"/>
+            <ac:spMk id="3" creationId="{00000000-0000-0000-0000-000000000000}"/>
+          </ac:spMkLst>
+        </pc:spChg>
+      </pc:sldChg>
+      <pc:sldChg chg="modSp mod">
+        <pc:chgData name="Ritu Gothwal" userId="b01fe2d9-9058-45ee-8f71-eb6d80a94993" providerId="ADAL" clId="{07608D2A-EAD5-439C-BA35-92C5E37B3F41}" dt="2025-02-06T16:49:39.087" v="181" actId="20577"/>
+        <pc:sldMkLst>
+          <pc:docMk/>
+          <pc:sldMk cId="0" sldId="259"/>
+        </pc:sldMkLst>
+        <pc:spChg chg="mod">
+          <ac:chgData name="Ritu Gothwal" userId="b01fe2d9-9058-45ee-8f71-eb6d80a94993" providerId="ADAL" clId="{07608D2A-EAD5-439C-BA35-92C5E37B3F41}" dt="2025-02-06T16:49:39.087" v="181" actId="20577"/>
+          <ac:spMkLst>
+            <pc:docMk/>
+            <pc:sldMk cId="0" sldId="259"/>
+            <ac:spMk id="3" creationId="{00000000-0000-0000-0000-000000000000}"/>
+          </ac:spMkLst>
+        </pc:spChg>
+      </pc:sldChg>
+      <pc:sldChg chg="modSp mod">
+        <pc:chgData name="Ritu Gothwal" userId="b01fe2d9-9058-45ee-8f71-eb6d80a94993" providerId="ADAL" clId="{07608D2A-EAD5-439C-BA35-92C5E37B3F41}" dt="2025-02-06T16:54:29.537" v="198" actId="27636"/>
+        <pc:sldMkLst>
+          <pc:docMk/>
+          <pc:sldMk cId="0" sldId="260"/>
+        </pc:sldMkLst>
+        <pc:spChg chg="mod">
+          <ac:chgData name="Ritu Gothwal" userId="b01fe2d9-9058-45ee-8f71-eb6d80a94993" providerId="ADAL" clId="{07608D2A-EAD5-439C-BA35-92C5E37B3F41}" dt="2025-02-06T16:54:29.537" v="198" actId="27636"/>
+          <ac:spMkLst>
+            <pc:docMk/>
+            <pc:sldMk cId="0" sldId="260"/>
             <ac:spMk id="3" creationId="{00000000-0000-0000-0000-000000000000}"/>
           </ac:spMkLst>
         </pc:spChg>
@@ -352,7 +382,7 @@
           <a:p>
             <a:fld id="{5BCAD085-E8A6-8845-BD4E-CB4CCA059FC4}" type="datetimeFigureOut">
               <a:rPr lang="en-US" smtClean="0"/>
-              <a:t>1/30/2025</a:t>
+              <a:t>2/6/2025</a:t>
             </a:fld>
             <a:endParaRPr lang="en-US"/>
           </a:p>
@@ -520,7 +550,7 @@
           <a:p>
             <a:fld id="{5BCAD085-E8A6-8845-BD4E-CB4CCA059FC4}" type="datetimeFigureOut">
               <a:rPr lang="en-US" smtClean="0"/>
-              <a:t>1/30/2025</a:t>
+              <a:t>2/6/2025</a:t>
             </a:fld>
             <a:endParaRPr lang="en-US"/>
           </a:p>
@@ -698,7 +728,7 @@
           <a:p>
             <a:fld id="{5BCAD085-E8A6-8845-BD4E-CB4CCA059FC4}" type="datetimeFigureOut">
               <a:rPr lang="en-US" smtClean="0"/>
-              <a:t>1/30/2025</a:t>
+              <a:t>2/6/2025</a:t>
             </a:fld>
             <a:endParaRPr lang="en-US"/>
           </a:p>
@@ -866,7 +896,7 @@
           <a:p>
             <a:fld id="{5BCAD085-E8A6-8845-BD4E-CB4CCA059FC4}" type="datetimeFigureOut">
               <a:rPr lang="en-US" smtClean="0"/>
-              <a:t>1/30/2025</a:t>
+              <a:t>2/6/2025</a:t>
             </a:fld>
             <a:endParaRPr lang="en-US"/>
           </a:p>
@@ -1111,7 +1141,7 @@
           <a:p>
             <a:fld id="{5BCAD085-E8A6-8845-BD4E-CB4CCA059FC4}" type="datetimeFigureOut">
               <a:rPr lang="en-US" smtClean="0"/>
-              <a:t>1/30/2025</a:t>
+              <a:t>2/6/2025</a:t>
             </a:fld>
             <a:endParaRPr lang="en-US"/>
           </a:p>
@@ -1396,7 +1426,7 @@
           <a:p>
             <a:fld id="{5BCAD085-E8A6-8845-BD4E-CB4CCA059FC4}" type="datetimeFigureOut">
               <a:rPr lang="en-US" smtClean="0"/>
-              <a:t>1/30/2025</a:t>
+              <a:t>2/6/2025</a:t>
             </a:fld>
             <a:endParaRPr lang="en-US"/>
           </a:p>
@@ -1815,7 +1845,7 @@
           <a:p>
             <a:fld id="{5BCAD085-E8A6-8845-BD4E-CB4CCA059FC4}" type="datetimeFigureOut">
               <a:rPr lang="en-US" smtClean="0"/>
-              <a:t>1/30/2025</a:t>
+              <a:t>2/6/2025</a:t>
             </a:fld>
             <a:endParaRPr lang="en-US"/>
           </a:p>
@@ -1932,7 +1962,7 @@
           <a:p>
             <a:fld id="{5BCAD085-E8A6-8845-BD4E-CB4CCA059FC4}" type="datetimeFigureOut">
               <a:rPr lang="en-US" smtClean="0"/>
-              <a:t>1/30/2025</a:t>
+              <a:t>2/6/2025</a:t>
             </a:fld>
             <a:endParaRPr lang="en-US"/>
           </a:p>
@@ -2027,7 +2057,7 @@
           <a:p>
             <a:fld id="{5BCAD085-E8A6-8845-BD4E-CB4CCA059FC4}" type="datetimeFigureOut">
               <a:rPr lang="en-US" smtClean="0"/>
-              <a:t>1/30/2025</a:t>
+              <a:t>2/6/2025</a:t>
             </a:fld>
             <a:endParaRPr lang="en-US"/>
           </a:p>
@@ -2302,7 +2332,7 @@
           <a:p>
             <a:fld id="{5BCAD085-E8A6-8845-BD4E-CB4CCA059FC4}" type="datetimeFigureOut">
               <a:rPr lang="en-US" smtClean="0"/>
-              <a:t>1/30/2025</a:t>
+              <a:t>2/6/2025</a:t>
             </a:fld>
             <a:endParaRPr lang="en-US"/>
           </a:p>
@@ -2554,7 +2584,7 @@
           <a:p>
             <a:fld id="{5BCAD085-E8A6-8845-BD4E-CB4CCA059FC4}" type="datetimeFigureOut">
               <a:rPr lang="en-US" smtClean="0"/>
-              <a:t>1/30/2025</a:t>
+              <a:t>2/6/2025</a:t>
             </a:fld>
             <a:endParaRPr lang="en-US"/>
           </a:p>
@@ -2765,7 +2795,7 @@
           <a:p>
             <a:fld id="{5BCAD085-E8A6-8845-BD4E-CB4CCA059FC4}" type="datetimeFigureOut">
               <a:rPr lang="en-US" smtClean="0"/>
-              <a:t>1/30/2025</a:t>
+              <a:t>2/6/2025</a:t>
             </a:fld>
             <a:endParaRPr lang="en-US"/>
           </a:p>
@@ -3861,13 +3891,15 @@
           <a:p>
             <a:r>
               <a:rPr sz="2000" dirty="0"/>
-              <a:t>- Automated calculations for Scope 1 and Scope 2 emissions</a:t>
-            </a:r>
-          </a:p>
-          <a:p>
+              <a:t>- </a:t>
+            </a:r>
+            <a:r>
+              <a:rPr lang="en-US" sz="2000" dirty="0"/>
+              <a:t>Automated </a:t>
+            </a:r>
             <a:r>
               <a:rPr sz="2000" dirty="0"/>
-              <a:t>- Conversion of emission values into different units</a:t>
+              <a:t>Conversion of emission values into different units</a:t>
             </a:r>
           </a:p>
           <a:p>
@@ -4024,27 +4056,101 @@
             <p:ph idx="1"/>
           </p:nvPr>
         </p:nvSpPr>
-        <p:spPr/>
-        <p:txBody>
-          <a:bodyPr/>
-          <a:lstStyle/>
-          <a:p>
-            <a:r>
-              <a:t>1. Developed and tested the app locally using Streamlit.</a:t>
-            </a:r>
-          </a:p>
-          <a:p>
-            <a:r>
+        <p:spPr>
+          <a:xfrm>
+            <a:off x="457200" y="1417638"/>
+            <a:ext cx="8229600" cy="4708525"/>
+          </a:xfrm>
+        </p:spPr>
+        <p:txBody>
+          <a:bodyPr>
+            <a:normAutofit/>
+          </a:bodyPr>
+          <a:lstStyle/>
+          <a:p>
+            <a:r>
+              <a:rPr sz="2000" dirty="0"/>
+              <a:t>1. Developed and tested the app locally using </a:t>
+            </a:r>
+            <a:r>
+              <a:rPr sz="2000" dirty="0" err="1"/>
+              <a:t>Streamlit</a:t>
+            </a:r>
+            <a:r>
+              <a:rPr sz="2000" dirty="0"/>
+              <a:t>.</a:t>
+            </a:r>
+            <a:endParaRPr lang="en-US" sz="2000" dirty="0"/>
+          </a:p>
+          <a:p>
+            <a:pPr marL="0" indent="0">
+              <a:buNone/>
+            </a:pPr>
+            <a:endParaRPr sz="2000" dirty="0"/>
+          </a:p>
+          <a:p>
+            <a:r>
+              <a:rPr sz="2000" dirty="0"/>
               <a:t>2. Pushed the project to GitHub for version control.</a:t>
             </a:r>
-          </a:p>
-          <a:p>
-            <a:r>
-              <a:t>3. Hosted the app on **Streamlit Community Cloud** for easy access.</a:t>
-            </a:r>
-          </a:p>
-          <a:p>
-            <a:r>
+            <a:endParaRPr lang="en-US" sz="2000" dirty="0"/>
+          </a:p>
+          <a:p>
+            <a:pPr marL="0" indent="0">
+              <a:buNone/>
+            </a:pPr>
+            <a:endParaRPr sz="2000" dirty="0"/>
+          </a:p>
+          <a:p>
+            <a:r>
+              <a:rPr sz="2000" dirty="0"/>
+              <a:t>3. Hosted the app on **</a:t>
+            </a:r>
+            <a:r>
+              <a:rPr sz="2000" dirty="0" err="1"/>
+              <a:t>Streamlit</a:t>
+            </a:r>
+            <a:r>
+              <a:rPr sz="2000" dirty="0"/>
+              <a:t> Community Cloud** for easy access.</a:t>
+            </a:r>
+            <a:endParaRPr lang="en-US" sz="2000" dirty="0"/>
+          </a:p>
+          <a:p>
+            <a:pPr marL="0" indent="0">
+              <a:buNone/>
+            </a:pPr>
+            <a:endParaRPr lang="en-US" sz="2000" dirty="0"/>
+          </a:p>
+          <a:p>
+            <a:r>
+              <a:rPr lang="en-US" sz="2000" dirty="0">
+                <a:hlinkClick r:id="rId2"/>
+              </a:rPr>
+              <a:t>Streamlit.io</a:t>
+            </a:r>
+            <a:r>
+              <a:rPr lang="en-US" sz="2000" dirty="0"/>
+              <a:t> is an open-source Python framework for building </a:t>
+            </a:r>
+            <a:r>
+              <a:rPr lang="en-US" sz="2000" b="1" dirty="0"/>
+              <a:t>interactive web applications</a:t>
+            </a:r>
+            <a:r>
+              <a:rPr lang="en-US" sz="2000" dirty="0"/>
+              <a:t> with minimal coding effort. It is especially popular among data scientists, engineers, and analysts for quickly converting Python scripts into user-friendly web apps.</a:t>
+            </a:r>
+          </a:p>
+          <a:p>
+            <a:pPr marL="0" indent="0">
+              <a:buNone/>
+            </a:pPr>
+            <a:endParaRPr sz="2000" dirty="0"/>
+          </a:p>
+          <a:p>
+            <a:r>
+              <a:rPr sz="2000" dirty="0"/>
               <a:t>4. Users can now access the tool via a web browser without needing to install anything.</a:t>
             </a:r>
           </a:p>

</xml_diff>